<commit_message>
feat : bayesian inference base model
</commit_message>
<xml_diff>
--- a/Presentations/MSC DISSERTATION Presentations.pptx
+++ b/Presentations/MSC DISSERTATION Presentations.pptx
@@ -170,6 +170,18 @@
 </p188:authorLst>
 </file>
 
+<file path=ppt/commentAuthors.xml><?xml version="1.0" encoding="utf-8"?>
+<p:cmAuthorLst xmlns:a="http://schemas.openxmlformats.org/drawingml/2006/main" xmlns:r="http://schemas.openxmlformats.org/officeDocument/2006/relationships" xmlns:p="http://schemas.openxmlformats.org/presentationml/2006/main">
+  <p:cmAuthor id="1" name="Grace Wangui" initials="GW" lastIdx="1" clrIdx="0">
+    <p:extLst>
+      <p:ext uri="{19B8F6BF-5375-455C-9EA6-DF929625EA0E}">
+        <p15:presenceInfo xmlns:p15="http://schemas.microsoft.com/office/powerpoint/2012/main" userId="9c2195d987c5f5a1" providerId="Windows Live"/>
+      </p:ext>
+    </p:extLst>
+  </p:cmAuthor>
+</p:cmAuthorLst>
+</file>
+
 <file path=ppt/handoutMasters/handoutMaster1.xml><?xml version="1.0" encoding="utf-8"?>
 <p:handoutMaster xmlns:a="http://schemas.openxmlformats.org/drawingml/2006/main" xmlns:r="http://schemas.openxmlformats.org/officeDocument/2006/relationships" xmlns:p="http://schemas.openxmlformats.org/presentationml/2006/main">
   <p:cSld>
@@ -227,7 +239,7 @@
           <a:p>
             <a:fld id="{FD913024-4032-4B4F-8680-09D5E08EDB6E}" type="datetimeFigureOut">
               <a:rPr lang="en-US" smtClean="0"/>
-              <a:t>6/25/2025</a:t>
+              <a:t>7/17/2025</a:t>
             </a:fld>
             <a:endParaRPr lang="en-US" dirty="0"/>
           </a:p>
@@ -404,7 +416,7 @@
           <a:p>
             <a:fld id="{F2AE225E-43E0-7047-8ADB-DD9EBB41B4D0}" type="datetimeFigureOut">
               <a:rPr lang="en-US" noProof="0" smtClean="0"/>
-              <a:t>6/25/2025</a:t>
+              <a:t>7/17/2025</a:t>
             </a:fld>
             <a:endParaRPr lang="en-US" noProof="0" dirty="0"/>
           </a:p>
@@ -27748,474 +27760,21 @@
           <a:lstStyle/>
           <a:p>
             <a:r>
-              <a:rPr lang="en-US" sz="3200" dirty="0"/>
-              <a:t>speaking impact </a:t>
+              <a:rPr lang="en-US" sz="3200" dirty="0">
+                <a:solidFill>
+                  <a:srgbClr val="0070C0"/>
+                </a:solidFill>
+              </a:rPr>
+              <a:t>Overall Schedule</a:t>
             </a:r>
-            <a:endParaRPr lang="en-US" dirty="0"/>
+            <a:endParaRPr lang="en-US" dirty="0">
+              <a:solidFill>
+                <a:srgbClr val="0070C0"/>
+              </a:solidFill>
+            </a:endParaRPr>
           </a:p>
         </p:txBody>
       </p:sp>
-      <p:sp>
-        <p:nvSpPr>
-          <p:cNvPr id="3" name="Content Placeholder 2">
-            <a:extLst>
-              <a:ext uri="{FF2B5EF4-FFF2-40B4-BE49-F238E27FC236}">
-                <a16:creationId xmlns:a16="http://schemas.microsoft.com/office/drawing/2014/main" id="{CF3ADB94-FC21-07C5-1FC9-E729C5DEDFC6}"/>
-              </a:ext>
-            </a:extLst>
-          </p:cNvPr>
-          <p:cNvSpPr>
-            <a:spLocks noGrp="1"/>
-          </p:cNvSpPr>
-          <p:nvPr>
-            <p:ph sz="quarter" idx="12"/>
-          </p:nvPr>
-        </p:nvSpPr>
-        <p:spPr>
-          <a:xfrm>
-            <a:off x="914399" y="2039111"/>
-            <a:ext cx="2816352" cy="3840480"/>
-          </a:xfrm>
-        </p:spPr>
-        <p:txBody>
-          <a:bodyPr/>
-          <a:lstStyle/>
-          <a:p>
-            <a:r>
-              <a:rPr lang="en-US" dirty="0"/>
-              <a:t>Learn to infuse energy into your delivery to leave a lasting impression</a:t>
-            </a:r>
-          </a:p>
-          <a:p>
-            <a:r>
-              <a:rPr lang="en-US" dirty="0"/>
-              <a:t>One of the goals of effective communication is to motivate your audience</a:t>
-            </a:r>
-          </a:p>
-          <a:p>
-            <a:endParaRPr lang="en-US" dirty="0"/>
-          </a:p>
-        </p:txBody>
-      </p:sp>
-      <p:graphicFrame>
-        <p:nvGraphicFramePr>
-          <p:cNvPr id="6" name="Table 4">
-            <a:extLst>
-              <a:ext uri="{FF2B5EF4-FFF2-40B4-BE49-F238E27FC236}">
-                <a16:creationId xmlns:a16="http://schemas.microsoft.com/office/drawing/2014/main" id="{D3F53A55-1F2B-EB7F-3E43-C43170D77989}"/>
-              </a:ext>
-            </a:extLst>
-          </p:cNvPr>
-          <p:cNvGraphicFramePr>
-            <a:graphicFrameLocks noGrp="1"/>
-          </p:cNvGraphicFramePr>
-          <p:nvPr>
-            <p:ph sz="quarter" idx="13"/>
-            <p:extLst>
-              <p:ext uri="{D42A27DB-BD31-4B8C-83A1-F6EECF244321}">
-                <p14:modId xmlns:p14="http://schemas.microsoft.com/office/powerpoint/2010/main" val="1332799362"/>
-              </p:ext>
-            </p:extLst>
-          </p:nvPr>
-        </p:nvGraphicFramePr>
-        <p:xfrm>
-          <a:off x="4097338" y="2038350"/>
-          <a:ext cx="7180262" cy="3902543"/>
-        </p:xfrm>
-        <a:graphic>
-          <a:graphicData uri="http://schemas.openxmlformats.org/drawingml/2006/table">
-            <a:tbl>
-              <a:tblPr firstRow="1" bandRow="1">
-                <a:tableStyleId>{C4B1156A-380E-4F78-BDF5-A606A8083BF9}</a:tableStyleId>
-              </a:tblPr>
-              <a:tblGrid>
-                <a:gridCol w="2383731">
-                  <a:extLst>
-                    <a:ext uri="{9D8B030D-6E8A-4147-A177-3AD203B41FA5}">
-                      <a16:colId xmlns:a16="http://schemas.microsoft.com/office/drawing/2014/main" val="1689330750"/>
-                    </a:ext>
-                  </a:extLst>
-                </a:gridCol>
-                <a:gridCol w="2077175">
-                  <a:extLst>
-                    <a:ext uri="{9D8B030D-6E8A-4147-A177-3AD203B41FA5}">
-                      <a16:colId xmlns:a16="http://schemas.microsoft.com/office/drawing/2014/main" val="2660631934"/>
-                    </a:ext>
-                  </a:extLst>
-                </a:gridCol>
-                <a:gridCol w="1359678">
-                  <a:extLst>
-                    <a:ext uri="{9D8B030D-6E8A-4147-A177-3AD203B41FA5}">
-                      <a16:colId xmlns:a16="http://schemas.microsoft.com/office/drawing/2014/main" val="3909717689"/>
-                    </a:ext>
-                  </a:extLst>
-                </a:gridCol>
-                <a:gridCol w="1359678">
-                  <a:extLst>
-                    <a:ext uri="{9D8B030D-6E8A-4147-A177-3AD203B41FA5}">
-                      <a16:colId xmlns:a16="http://schemas.microsoft.com/office/drawing/2014/main" val="1603189107"/>
-                    </a:ext>
-                  </a:extLst>
-                </a:gridCol>
-              </a:tblGrid>
-              <a:tr h="618076">
-                <a:tc>
-                  <a:txBody>
-                    <a:bodyPr/>
-                    <a:lstStyle/>
-                    <a:p>
-                      <a:r>
-                        <a:rPr lang="en-US" sz="2000" b="0" dirty="0"/>
-                        <a:t>METRIC</a:t>
-                      </a:r>
-                    </a:p>
-                  </a:txBody>
-                  <a:tcPr anchor="ctr"/>
-                </a:tc>
-                <a:tc>
-                  <a:txBody>
-                    <a:bodyPr/>
-                    <a:lstStyle/>
-                    <a:p>
-                      <a:r>
-                        <a:rPr lang="en-US" sz="2000" b="0" dirty="0"/>
-                        <a:t>MEASUREMENT</a:t>
-                      </a:r>
-                    </a:p>
-                  </a:txBody>
-                  <a:tcPr anchor="ctr"/>
-                </a:tc>
-                <a:tc>
-                  <a:txBody>
-                    <a:bodyPr/>
-                    <a:lstStyle/>
-                    <a:p>
-                      <a:r>
-                        <a:rPr lang="en-US" sz="2000" b="0" dirty="0"/>
-                        <a:t>TARGET</a:t>
-                      </a:r>
-                    </a:p>
-                  </a:txBody>
-                  <a:tcPr anchor="ctr"/>
-                </a:tc>
-                <a:tc>
-                  <a:txBody>
-                    <a:bodyPr/>
-                    <a:lstStyle/>
-                    <a:p>
-                      <a:r>
-                        <a:rPr lang="en-US" sz="2000" b="0" dirty="0"/>
-                        <a:t>ACTUAL</a:t>
-                      </a:r>
-                    </a:p>
-                  </a:txBody>
-                  <a:tcPr anchor="ctr"/>
-                </a:tc>
-                <a:extLst>
-                  <a:ext uri="{0D108BD9-81ED-4DB2-BD59-A6C34878D82A}">
-                    <a16:rowId xmlns:a16="http://schemas.microsoft.com/office/drawing/2014/main" val="479928716"/>
-                  </a:ext>
-                </a:extLst>
-              </a:tr>
-              <a:tr h="618076">
-                <a:tc>
-                  <a:txBody>
-                    <a:bodyPr/>
-                    <a:lstStyle/>
-                    <a:p>
-                      <a:r>
-                        <a:rPr lang="en-US" sz="2000" b="0" dirty="0"/>
-                        <a:t>Audience attendance</a:t>
-                      </a:r>
-                    </a:p>
-                  </a:txBody>
-                  <a:tcPr anchor="ctr"/>
-                </a:tc>
-                <a:tc>
-                  <a:txBody>
-                    <a:bodyPr/>
-                    <a:lstStyle/>
-                    <a:p>
-                      <a:r>
-                        <a:rPr lang="en-US" sz="2000" b="0" dirty="0"/>
-                        <a:t># of attendees</a:t>
-                      </a:r>
-                    </a:p>
-                  </a:txBody>
-                  <a:tcPr anchor="ctr"/>
-                </a:tc>
-                <a:tc>
-                  <a:txBody>
-                    <a:bodyPr/>
-                    <a:lstStyle/>
-                    <a:p>
-                      <a:r>
-                        <a:rPr lang="en-US" sz="2000" b="0" dirty="0"/>
-                        <a:t>150</a:t>
-                      </a:r>
-                    </a:p>
-                  </a:txBody>
-                  <a:tcPr anchor="ctr"/>
-                </a:tc>
-                <a:tc>
-                  <a:txBody>
-                    <a:bodyPr/>
-                    <a:lstStyle/>
-                    <a:p>
-                      <a:r>
-                        <a:rPr lang="en-US" sz="2000" b="0" dirty="0"/>
-                        <a:t>120</a:t>
-                      </a:r>
-                    </a:p>
-                  </a:txBody>
-                  <a:tcPr anchor="ctr"/>
-                </a:tc>
-                <a:extLst>
-                  <a:ext uri="{0D108BD9-81ED-4DB2-BD59-A6C34878D82A}">
-                    <a16:rowId xmlns:a16="http://schemas.microsoft.com/office/drawing/2014/main" val="1760208656"/>
-                  </a:ext>
-                </a:extLst>
-              </a:tr>
-              <a:tr h="618076">
-                <a:tc>
-                  <a:txBody>
-                    <a:bodyPr/>
-                    <a:lstStyle/>
-                    <a:p>
-                      <a:r>
-                        <a:rPr lang="en-US" sz="2000" b="0" dirty="0"/>
-                        <a:t>Engagement duration</a:t>
-                      </a:r>
-                    </a:p>
-                  </a:txBody>
-                  <a:tcPr anchor="ctr"/>
-                </a:tc>
-                <a:tc>
-                  <a:txBody>
-                    <a:bodyPr/>
-                    <a:lstStyle/>
-                    <a:p>
-                      <a:r>
-                        <a:rPr lang="en-US" sz="2000" b="0" dirty="0"/>
-                        <a:t>Minutes</a:t>
-                      </a:r>
-                    </a:p>
-                  </a:txBody>
-                  <a:tcPr anchor="ctr"/>
-                </a:tc>
-                <a:tc>
-                  <a:txBody>
-                    <a:bodyPr/>
-                    <a:lstStyle/>
-                    <a:p>
-                      <a:r>
-                        <a:rPr lang="en-US" sz="2000" b="0" dirty="0"/>
-                        <a:t>60</a:t>
-                      </a:r>
-                    </a:p>
-                  </a:txBody>
-                  <a:tcPr anchor="ctr"/>
-                </a:tc>
-                <a:tc>
-                  <a:txBody>
-                    <a:bodyPr/>
-                    <a:lstStyle/>
-                    <a:p>
-                      <a:r>
-                        <a:rPr lang="en-US" sz="2000" b="0" dirty="0"/>
-                        <a:t>75</a:t>
-                      </a:r>
-                    </a:p>
-                  </a:txBody>
-                  <a:tcPr anchor="ctr"/>
-                </a:tc>
-                <a:extLst>
-                  <a:ext uri="{0D108BD9-81ED-4DB2-BD59-A6C34878D82A}">
-                    <a16:rowId xmlns:a16="http://schemas.microsoft.com/office/drawing/2014/main" val="3634243071"/>
-                  </a:ext>
-                </a:extLst>
-              </a:tr>
-              <a:tr h="618076">
-                <a:tc>
-                  <a:txBody>
-                    <a:bodyPr/>
-                    <a:lstStyle/>
-                    <a:p>
-                      <a:r>
-                        <a:rPr lang="en-US" sz="2000" b="0" dirty="0"/>
-                        <a:t>Q&amp;A interaction</a:t>
-                      </a:r>
-                    </a:p>
-                  </a:txBody>
-                  <a:tcPr anchor="ctr"/>
-                </a:tc>
-                <a:tc>
-                  <a:txBody>
-                    <a:bodyPr/>
-                    <a:lstStyle/>
-                    <a:p>
-                      <a:r>
-                        <a:rPr lang="en-US" sz="2000" b="0" dirty="0"/>
-                        <a:t># of questions</a:t>
-                      </a:r>
-                    </a:p>
-                  </a:txBody>
-                  <a:tcPr anchor="ctr"/>
-                </a:tc>
-                <a:tc>
-                  <a:txBody>
-                    <a:bodyPr/>
-                    <a:lstStyle/>
-                    <a:p>
-                      <a:r>
-                        <a:rPr lang="en-US" sz="2000" b="0" dirty="0"/>
-                        <a:t>10</a:t>
-                      </a:r>
-                    </a:p>
-                  </a:txBody>
-                  <a:tcPr anchor="ctr"/>
-                </a:tc>
-                <a:tc>
-                  <a:txBody>
-                    <a:bodyPr/>
-                    <a:lstStyle/>
-                    <a:p>
-                      <a:r>
-                        <a:rPr lang="en-US" sz="2000" b="0" dirty="0"/>
-                        <a:t>15</a:t>
-                      </a:r>
-                    </a:p>
-                  </a:txBody>
-                  <a:tcPr anchor="ctr"/>
-                </a:tc>
-                <a:extLst>
-                  <a:ext uri="{0D108BD9-81ED-4DB2-BD59-A6C34878D82A}">
-                    <a16:rowId xmlns:a16="http://schemas.microsoft.com/office/drawing/2014/main" val="415808797"/>
-                  </a:ext>
-                </a:extLst>
-              </a:tr>
-              <a:tr h="618076">
-                <a:tc>
-                  <a:txBody>
-                    <a:bodyPr/>
-                    <a:lstStyle/>
-                    <a:p>
-                      <a:r>
-                        <a:rPr lang="en-US" sz="2000" b="0" dirty="0"/>
-                        <a:t>Positive feedback</a:t>
-                      </a:r>
-                    </a:p>
-                  </a:txBody>
-                  <a:tcPr anchor="ctr"/>
-                </a:tc>
-                <a:tc>
-                  <a:txBody>
-                    <a:bodyPr/>
-                    <a:lstStyle/>
-                    <a:p>
-                      <a:r>
-                        <a:rPr lang="en-US" sz="2000" b="0" dirty="0"/>
-                        <a:t>Percentage (%)</a:t>
-                      </a:r>
-                    </a:p>
-                  </a:txBody>
-                  <a:tcPr anchor="ctr"/>
-                </a:tc>
-                <a:tc>
-                  <a:txBody>
-                    <a:bodyPr/>
-                    <a:lstStyle/>
-                    <a:p>
-                      <a:r>
-                        <a:rPr lang="en-US" sz="2000" b="0" dirty="0"/>
-                        <a:t>90</a:t>
-                      </a:r>
-                    </a:p>
-                  </a:txBody>
-                  <a:tcPr anchor="ctr"/>
-                </a:tc>
-                <a:tc>
-                  <a:txBody>
-                    <a:bodyPr/>
-                    <a:lstStyle/>
-                    <a:p>
-                      <a:r>
-                        <a:rPr lang="en-US" sz="2000" b="0" dirty="0"/>
-                        <a:t>95</a:t>
-                      </a:r>
-                    </a:p>
-                  </a:txBody>
-                  <a:tcPr anchor="ctr"/>
-                </a:tc>
-                <a:extLst>
-                  <a:ext uri="{0D108BD9-81ED-4DB2-BD59-A6C34878D82A}">
-                    <a16:rowId xmlns:a16="http://schemas.microsoft.com/office/drawing/2014/main" val="3150194648"/>
-                  </a:ext>
-                </a:extLst>
-              </a:tr>
-              <a:tr h="812163">
-                <a:tc>
-                  <a:txBody>
-                    <a:bodyPr/>
-                    <a:lstStyle/>
-                    <a:p>
-                      <a:r>
-                        <a:rPr lang="en-US" sz="2000" b="0" dirty="0"/>
-                        <a:t>Rate of information retention</a:t>
-                      </a:r>
-                    </a:p>
-                  </a:txBody>
-                  <a:tcPr anchor="ctr"/>
-                </a:tc>
-                <a:tc>
-                  <a:txBody>
-                    <a:bodyPr/>
-                    <a:lstStyle/>
-                    <a:p>
-                      <a:r>
-                        <a:rPr lang="en-US" sz="2000" b="0" dirty="0"/>
-                        <a:t>Percentage (%)</a:t>
-                      </a:r>
-                    </a:p>
-                  </a:txBody>
-                  <a:tcPr anchor="ctr"/>
-                </a:tc>
-                <a:tc>
-                  <a:txBody>
-                    <a:bodyPr/>
-                    <a:lstStyle/>
-                    <a:p>
-                      <a:r>
-                        <a:rPr lang="en-US" sz="2000" b="0" dirty="0"/>
-                        <a:t>80</a:t>
-                      </a:r>
-                    </a:p>
-                  </a:txBody>
-                  <a:tcPr anchor="ctr"/>
-                </a:tc>
-                <a:tc>
-                  <a:txBody>
-                    <a:bodyPr/>
-                    <a:lstStyle/>
-                    <a:p>
-                      <a:r>
-                        <a:rPr lang="en-US" sz="2000" b="0" dirty="0"/>
-                        <a:t>85</a:t>
-                      </a:r>
-                    </a:p>
-                  </a:txBody>
-                  <a:tcPr anchor="ctr"/>
-                </a:tc>
-                <a:extLst>
-                  <a:ext uri="{0D108BD9-81ED-4DB2-BD59-A6C34878D82A}">
-                    <a16:rowId xmlns:a16="http://schemas.microsoft.com/office/drawing/2014/main" val="380950325"/>
-                  </a:ext>
-                </a:extLst>
-              </a:tr>
-            </a:tbl>
-          </a:graphicData>
-        </a:graphic>
-      </p:graphicFrame>
       <p:sp>
         <p:nvSpPr>
           <p:cNvPr id="5" name="Slide Number Placeholder 4">
@@ -28248,6 +27807,107 @@
               <a:t>10</a:t>
             </a:fld>
             <a:endParaRPr lang="en-US" dirty="0"/>
+          </a:p>
+        </p:txBody>
+      </p:sp>
+      <p:sp>
+        <p:nvSpPr>
+          <p:cNvPr id="4" name="Content Placeholder 3">
+            <a:extLst>
+              <a:ext uri="{FF2B5EF4-FFF2-40B4-BE49-F238E27FC236}">
+                <a16:creationId xmlns:a16="http://schemas.microsoft.com/office/drawing/2014/main" id="{C652B6E1-806F-42DB-A278-51FB9962E5DB}"/>
+              </a:ext>
+            </a:extLst>
+          </p:cNvPr>
+          <p:cNvSpPr>
+            <a:spLocks noGrp="1"/>
+          </p:cNvSpPr>
+          <p:nvPr>
+            <p:ph sz="quarter" idx="13"/>
+          </p:nvPr>
+        </p:nvSpPr>
+        <p:spPr>
+          <a:xfrm>
+            <a:off x="827773" y="2039111"/>
+            <a:ext cx="10219467" cy="3840480"/>
+          </a:xfrm>
+        </p:spPr>
+        <p:txBody>
+          <a:bodyPr/>
+          <a:lstStyle/>
+          <a:p>
+            <a:pPr marL="342900" indent="-342900">
+              <a:buFontTx/>
+              <a:buChar char="-"/>
+            </a:pPr>
+            <a:r>
+              <a:rPr lang="en-US" sz="2800" dirty="0">
+                <a:solidFill>
+                  <a:srgbClr val="543E34"/>
+                </a:solidFill>
+                <a:latin typeface="Perpetua" panose="02020502060401020303" pitchFamily="18" charset="0"/>
+                <a:ea typeface="+mj-ea"/>
+                <a:cs typeface="+mj-cs"/>
+              </a:rPr>
+              <a:t>On track – Design and Implementation stage </a:t>
+            </a:r>
+          </a:p>
+          <a:p>
+            <a:pPr marL="342900" indent="-342900">
+              <a:buFontTx/>
+              <a:buChar char="-"/>
+            </a:pPr>
+            <a:r>
+              <a:rPr lang="en-US" sz="2800" dirty="0">
+                <a:solidFill>
+                  <a:srgbClr val="543E34"/>
+                </a:solidFill>
+                <a:latin typeface="Perpetua" panose="02020502060401020303" pitchFamily="18" charset="0"/>
+                <a:ea typeface="+mj-ea"/>
+                <a:cs typeface="+mj-cs"/>
+              </a:rPr>
+              <a:t>2 weeks – Causal Inference</a:t>
+            </a:r>
+          </a:p>
+          <a:p>
+            <a:pPr marL="342900" indent="-342900">
+              <a:buFontTx/>
+              <a:buChar char="-"/>
+            </a:pPr>
+            <a:r>
+              <a:rPr lang="en-US" sz="2800" dirty="0">
+                <a:solidFill>
+                  <a:srgbClr val="543E34"/>
+                </a:solidFill>
+                <a:latin typeface="Perpetua" panose="02020502060401020303" pitchFamily="18" charset="0"/>
+                <a:ea typeface="+mj-ea"/>
+                <a:cs typeface="+mj-cs"/>
+              </a:rPr>
+              <a:t>2 weeks - Bayesian</a:t>
+            </a:r>
+          </a:p>
+          <a:p>
+            <a:pPr marL="342900" indent="-342900">
+              <a:buFontTx/>
+              <a:buChar char="-"/>
+            </a:pPr>
+            <a:r>
+              <a:rPr lang="en-US" sz="2800" dirty="0">
+                <a:solidFill>
+                  <a:srgbClr val="543E34"/>
+                </a:solidFill>
+                <a:latin typeface="Perpetua" panose="02020502060401020303" pitchFamily="18" charset="0"/>
+                <a:ea typeface="+mj-ea"/>
+                <a:cs typeface="+mj-cs"/>
+              </a:rPr>
+              <a:t>2 weeks – Evaluations &amp; Conclusions</a:t>
+            </a:r>
+          </a:p>
+          <a:p>
+            <a:pPr marL="0" indent="0">
+              <a:buNone/>
+            </a:pPr>
+            <a:endParaRPr lang="en-GB" sz="2800" dirty="0"/>
           </a:p>
         </p:txBody>
       </p:sp>
@@ -28303,10 +27963,18 @@
           <a:lstStyle/>
           <a:p>
             <a:r>
-              <a:rPr lang="en-US" sz="3200" dirty="0"/>
-              <a:t>final tips &amp; takeaways</a:t>
+              <a:rPr lang="en-US" sz="3200" dirty="0">
+                <a:solidFill>
+                  <a:srgbClr val="0070C0"/>
+                </a:solidFill>
+              </a:rPr>
+              <a:t>Week 5</a:t>
             </a:r>
-            <a:endParaRPr lang="en-US" dirty="0"/>
+            <a:endParaRPr lang="en-US" dirty="0">
+              <a:solidFill>
+                <a:srgbClr val="0070C0"/>
+              </a:solidFill>
+            </a:endParaRPr>
           </a:p>
         </p:txBody>
       </p:sp>
@@ -28328,125 +27996,279 @@
         </p:nvSpPr>
         <p:spPr>
           <a:xfrm>
-            <a:off x="914399" y="2039111"/>
-            <a:ext cx="6729984" cy="3840480"/>
+            <a:off x="914398" y="2039111"/>
+            <a:ext cx="10744201" cy="3840480"/>
           </a:xfrm>
         </p:spPr>
         <p:txBody>
           <a:bodyPr>
-            <a:normAutofit/>
+            <a:normAutofit fontScale="92500" lnSpcReduction="10000"/>
           </a:bodyPr>
           <a:lstStyle/>
           <a:p>
+            <a:pPr marL="0" marR="0" lvl="0" indent="0" algn="l" defTabSz="914400" rtl="0" eaLnBrk="1" fontAlgn="auto" latinLnBrk="0" hangingPunct="1">
+              <a:lnSpc>
+                <a:spcPct val="90000"/>
+              </a:lnSpc>
+              <a:spcBef>
+                <a:spcPts val="1000"/>
+              </a:spcBef>
+              <a:spcAft>
+                <a:spcPts val="0"/>
+              </a:spcAft>
+              <a:buClrTx/>
+              <a:buSzTx/>
+              <a:buFont typeface="Arial" panose="020B0604020202020204" pitchFamily="34" charset="0"/>
+              <a:buNone/>
+              <a:tabLst/>
+              <a:defRPr/>
+            </a:pPr>
             <a:r>
-              <a:rPr lang="en-US" dirty="0"/>
-              <a:t>CONSISTENT REHEARSAL</a:t>
+              <a:rPr kumimoji="0" lang="en-US" sz="1800" b="0" i="0" u="none" strike="noStrike" kern="1200" cap="none" spc="0" normalizeH="0" baseline="0" noProof="0" dirty="0">
+                <a:ln>
+                  <a:noFill/>
+                </a:ln>
+                <a:solidFill>
+                  <a:srgbClr val="543E34"/>
+                </a:solidFill>
+                <a:effectLst/>
+                <a:uLnTx/>
+                <a:uFillTx/>
+                <a:latin typeface="Perpetua" panose="02020502060401020303" pitchFamily="18" charset="0"/>
+                <a:ea typeface="+mj-ea"/>
+                <a:cs typeface="+mj-cs"/>
+              </a:rPr>
+              <a:t>- </a:t>
+            </a:r>
+            <a:r>
+              <a:rPr kumimoji="0" lang="en-GB" sz="3600" b="0" i="0" u="none" strike="noStrike" kern="1200" cap="none" spc="0" normalizeH="0" baseline="0" noProof="0" dirty="0">
+                <a:ln>
+                  <a:noFill/>
+                </a:ln>
+                <a:solidFill>
+                  <a:srgbClr val="543E34"/>
+                </a:solidFill>
+                <a:effectLst/>
+                <a:uLnTx/>
+                <a:uFillTx/>
+                <a:latin typeface="Perpetua" panose="02020502060401020303" pitchFamily="18" charset="0"/>
+                <a:ea typeface="+mn-ea"/>
+                <a:cs typeface="+mn-cs"/>
+              </a:rPr>
+              <a:t>Defined and implemented a Bayesian linear regression model in </a:t>
+            </a:r>
+            <a:r>
+              <a:rPr kumimoji="0" lang="en-GB" sz="3600" b="0" i="0" u="none" strike="noStrike" kern="1200" cap="none" spc="0" normalizeH="0" baseline="0" noProof="0" dirty="0" err="1">
+                <a:ln>
+                  <a:noFill/>
+                </a:ln>
+                <a:solidFill>
+                  <a:srgbClr val="543E34"/>
+                </a:solidFill>
+                <a:effectLst/>
+                <a:uLnTx/>
+                <a:uFillTx/>
+                <a:latin typeface="Perpetua" panose="02020502060401020303" pitchFamily="18" charset="0"/>
+                <a:ea typeface="+mn-ea"/>
+                <a:cs typeface="+mn-cs"/>
+              </a:rPr>
+              <a:t>PyMC</a:t>
+            </a:r>
+            <a:r>
+              <a:rPr kumimoji="0" lang="en-GB" sz="3600" b="0" i="0" u="none" strike="noStrike" kern="1200" cap="none" spc="0" normalizeH="0" baseline="0" noProof="0" dirty="0">
+                <a:ln>
+                  <a:noFill/>
+                </a:ln>
+                <a:solidFill>
+                  <a:srgbClr val="543E34"/>
+                </a:solidFill>
+                <a:effectLst/>
+                <a:uLnTx/>
+                <a:uFillTx/>
+                <a:latin typeface="Perpetua" panose="02020502060401020303" pitchFamily="18" charset="0"/>
+                <a:ea typeface="+mn-ea"/>
+                <a:cs typeface="+mn-cs"/>
+              </a:rPr>
+              <a:t>- For this I started with a base model focusing on the variables that made up the composite skill score. </a:t>
             </a:r>
           </a:p>
           <a:p>
-            <a:pPr lvl="1"/>
+            <a:pPr marL="0" marR="0" lvl="0" indent="0" algn="l" defTabSz="914400" rtl="0" eaLnBrk="1" fontAlgn="auto" latinLnBrk="0" hangingPunct="1">
+              <a:lnSpc>
+                <a:spcPct val="90000"/>
+              </a:lnSpc>
+              <a:spcBef>
+                <a:spcPts val="1000"/>
+              </a:spcBef>
+              <a:spcAft>
+                <a:spcPts val="0"/>
+              </a:spcAft>
+              <a:buClrTx/>
+              <a:buSzTx/>
+              <a:buFont typeface="Arial" panose="020B0604020202020204" pitchFamily="34" charset="0"/>
+              <a:buNone/>
+              <a:tabLst/>
+              <a:defRPr/>
+            </a:pPr>
             <a:r>
-              <a:rPr lang="en-US" dirty="0"/>
-              <a:t>Strengthen your familiarity</a:t>
+              <a:rPr kumimoji="0" lang="en-GB" sz="3600" b="0" i="0" u="none" strike="noStrike" kern="1200" cap="none" spc="0" normalizeH="0" baseline="0" noProof="0" dirty="0">
+                <a:ln>
+                  <a:noFill/>
+                </a:ln>
+                <a:solidFill>
+                  <a:srgbClr val="543E34"/>
+                </a:solidFill>
+                <a:effectLst/>
+                <a:uLnTx/>
+                <a:uFillTx/>
+                <a:latin typeface="Perpetua" panose="02020502060401020303" pitchFamily="18" charset="0"/>
+                <a:ea typeface="+mn-ea"/>
+                <a:cs typeface="+mn-cs"/>
+              </a:rPr>
+              <a:t> - Tested different sample sizes , draws and steps  to ensured there were no divergences in sampling (indicating stable inference)</a:t>
             </a:r>
           </a:p>
           <a:p>
+            <a:pPr marR="0" lvl="0" algn="l" defTabSz="914400" rtl="0" eaLnBrk="1" fontAlgn="auto" latinLnBrk="0" hangingPunct="1">
+              <a:lnSpc>
+                <a:spcPct val="90000"/>
+              </a:lnSpc>
+              <a:spcBef>
+                <a:spcPts val="1000"/>
+              </a:spcBef>
+              <a:spcAft>
+                <a:spcPts val="0"/>
+              </a:spcAft>
+              <a:buClrTx/>
+              <a:buSzTx/>
+              <a:buFontTx/>
+              <a:buChar char="-"/>
+              <a:tabLst/>
+              <a:defRPr/>
+            </a:pPr>
             <a:r>
-              <a:rPr lang="en-US" dirty="0"/>
-              <a:t>REFINE DELIVERY STYLE</a:t>
+              <a:rPr kumimoji="0" lang="en-GB" sz="3600" b="0" i="0" u="none" strike="noStrike" kern="1200" cap="none" spc="0" normalizeH="0" baseline="0" noProof="0" dirty="0">
+                <a:ln>
+                  <a:noFill/>
+                </a:ln>
+                <a:solidFill>
+                  <a:srgbClr val="543E34"/>
+                </a:solidFill>
+                <a:effectLst/>
+                <a:uLnTx/>
+                <a:uFillTx/>
+                <a:latin typeface="Perpetua" panose="02020502060401020303" pitchFamily="18" charset="0"/>
+                <a:ea typeface="+mn-ea"/>
+                <a:cs typeface="+mn-cs"/>
+              </a:rPr>
+              <a:t>Did more reading on Bayesian on the implementation end and now I feel I have a solid understanding of it implementation-wise</a:t>
             </a:r>
           </a:p>
           <a:p>
-            <a:pPr lvl="1"/>
+            <a:pPr marR="0" lvl="0" algn="l" defTabSz="914400" rtl="0" eaLnBrk="1" fontAlgn="auto" latinLnBrk="0" hangingPunct="1">
+              <a:lnSpc>
+                <a:spcPct val="90000"/>
+              </a:lnSpc>
+              <a:spcBef>
+                <a:spcPts val="1000"/>
+              </a:spcBef>
+              <a:spcAft>
+                <a:spcPts val="0"/>
+              </a:spcAft>
+              <a:buClrTx/>
+              <a:buSzTx/>
+              <a:buFontTx/>
+              <a:buChar char="-"/>
+              <a:tabLst/>
+              <a:defRPr/>
+            </a:pPr>
             <a:r>
-              <a:rPr lang="en-US" dirty="0"/>
-              <a:t>Pacing, tone, and emphasis</a:t>
+              <a:rPr kumimoji="0" lang="en-GB" sz="3600" b="0" i="0" u="none" strike="noStrike" kern="1200" cap="none" spc="0" normalizeH="0" baseline="0" noProof="0" dirty="0">
+                <a:ln>
+                  <a:noFill/>
+                </a:ln>
+                <a:solidFill>
+                  <a:srgbClr val="543E34"/>
+                </a:solidFill>
+                <a:effectLst/>
+                <a:uLnTx/>
+                <a:uFillTx/>
+                <a:latin typeface="Perpetua" panose="02020502060401020303" pitchFamily="18" charset="0"/>
+                <a:ea typeface="+mn-ea"/>
+                <a:cs typeface="+mn-cs"/>
+              </a:rPr>
+              <a:t>-Code </a:t>
+            </a:r>
+            <a:r>
+              <a:rPr kumimoji="0" lang="en-GB" sz="3600" b="0" i="0" u="none" strike="noStrike" kern="1200" cap="none" spc="0" normalizeH="0" baseline="0" noProof="0" dirty="0" err="1">
+                <a:ln>
+                  <a:noFill/>
+                </a:ln>
+                <a:solidFill>
+                  <a:srgbClr val="543E34"/>
+                </a:solidFill>
+                <a:effectLst/>
+                <a:uLnTx/>
+                <a:uFillTx/>
+                <a:latin typeface="Perpetua" panose="02020502060401020303" pitchFamily="18" charset="0"/>
+                <a:ea typeface="+mn-ea"/>
+                <a:cs typeface="+mn-cs"/>
+              </a:rPr>
+              <a:t>cleanup</a:t>
+            </a:r>
+            <a:r>
+              <a:rPr kumimoji="0" lang="en-GB" sz="3600" b="0" i="0" u="none" strike="noStrike" kern="1200" cap="none" spc="0" normalizeH="0" baseline="0" noProof="0" dirty="0">
+                <a:ln>
+                  <a:noFill/>
+                </a:ln>
+                <a:solidFill>
+                  <a:srgbClr val="543E34"/>
+                </a:solidFill>
+                <a:effectLst/>
+                <a:uLnTx/>
+                <a:uFillTx/>
+                <a:latin typeface="Perpetua" panose="02020502060401020303" pitchFamily="18" charset="0"/>
+                <a:ea typeface="+mn-ea"/>
+                <a:cs typeface="+mn-cs"/>
+              </a:rPr>
+              <a:t> &amp; dependencies management</a:t>
             </a:r>
           </a:p>
           <a:p>
-            <a:r>
-              <a:rPr lang="en-US" dirty="0"/>
-              <a:t>TIMING AND TRANSITIONS</a:t>
-            </a:r>
+            <a:pPr marL="0" marR="0" lvl="0" indent="0" algn="l" defTabSz="914400" rtl="0" eaLnBrk="1" fontAlgn="auto" latinLnBrk="0" hangingPunct="1">
+              <a:lnSpc>
+                <a:spcPct val="90000"/>
+              </a:lnSpc>
+              <a:spcBef>
+                <a:spcPts val="1000"/>
+              </a:spcBef>
+              <a:spcAft>
+                <a:spcPts val="0"/>
+              </a:spcAft>
+              <a:buClrTx/>
+              <a:buSzTx/>
+              <a:buFont typeface="Arial" panose="020B0604020202020204" pitchFamily="34" charset="0"/>
+              <a:buNone/>
+              <a:tabLst/>
+              <a:defRPr/>
+            </a:pPr>
+            <a:endParaRPr kumimoji="0" lang="en-US" sz="3600" b="0" i="0" u="none" strike="noStrike" kern="1200" cap="none" spc="0" normalizeH="0" baseline="0" noProof="0" dirty="0">
+              <a:ln>
+                <a:noFill/>
+              </a:ln>
+              <a:solidFill>
+                <a:srgbClr val="543E34"/>
+              </a:solidFill>
+              <a:effectLst/>
+              <a:uLnTx/>
+              <a:uFillTx/>
+              <a:latin typeface="Perpetua" panose="02020502060401020303" pitchFamily="18" charset="0"/>
+              <a:ea typeface="+mn-ea"/>
+              <a:cs typeface="+mn-cs"/>
+            </a:endParaRPr>
           </a:p>
           <a:p>
-            <a:pPr lvl="1"/>
-            <a:r>
-              <a:rPr lang="en-US" dirty="0"/>
-              <a:t>Aim for seamless, professional delivery</a:t>
-            </a:r>
-          </a:p>
-          <a:p>
-            <a:r>
-              <a:rPr lang="en-US" dirty="0"/>
-              <a:t>PRACTICE AUDIENCE</a:t>
-            </a:r>
-          </a:p>
-          <a:p>
-            <a:pPr lvl="1"/>
-            <a:r>
-              <a:rPr lang="en-US" dirty="0"/>
-              <a:t>Enlist colleagues to listen &amp; provide feedback</a:t>
-            </a:r>
-          </a:p>
-        </p:txBody>
-      </p:sp>
-      <p:sp>
-        <p:nvSpPr>
-          <p:cNvPr id="5" name="Content Placeholder 4">
-            <a:extLst>
-              <a:ext uri="{FF2B5EF4-FFF2-40B4-BE49-F238E27FC236}">
-                <a16:creationId xmlns:a16="http://schemas.microsoft.com/office/drawing/2014/main" id="{7DA9EE9E-3073-7E11-3AA5-F77C3B48A97F}"/>
-              </a:ext>
-            </a:extLst>
-          </p:cNvPr>
-          <p:cNvSpPr>
-            <a:spLocks noGrp="1"/>
-          </p:cNvSpPr>
-          <p:nvPr>
-            <p:ph sz="quarter" idx="12"/>
-          </p:nvPr>
-        </p:nvSpPr>
-        <p:spPr>
-          <a:xfrm>
-            <a:off x="8113472" y="2039111"/>
-            <a:ext cx="3163824" cy="3840480"/>
-          </a:xfrm>
-        </p:spPr>
-        <p:txBody>
-          <a:bodyPr>
-            <a:normAutofit/>
-          </a:bodyPr>
-          <a:lstStyle/>
-          <a:p>
-            <a:r>
-              <a:rPr lang="en-US" dirty="0"/>
-              <a:t>Seek feedback</a:t>
-            </a:r>
-          </a:p>
-          <a:p>
-            <a:r>
-              <a:rPr lang="en-US" dirty="0"/>
-              <a:t>Reflect on performance</a:t>
-            </a:r>
-          </a:p>
-          <a:p>
-            <a:r>
-              <a:rPr lang="en-US" dirty="0"/>
-              <a:t>Explore new techniques</a:t>
-            </a:r>
-          </a:p>
-          <a:p>
-            <a:r>
-              <a:rPr lang="en-US" dirty="0"/>
-              <a:t>Set personal goals</a:t>
-            </a:r>
-          </a:p>
-          <a:p>
-            <a:r>
-              <a:rPr lang="en-US" dirty="0"/>
-              <a:t>Iterate and adapt</a:t>
-            </a:r>
+            <a:endParaRPr lang="en-US" dirty="0"/>
           </a:p>
         </p:txBody>
       </p:sp>
@@ -28542,527 +28364,16 @@
           <a:lstStyle/>
           <a:p>
             <a:r>
-              <a:rPr lang="en-US" dirty="0"/>
-              <a:t>speaking engagement metrics</a:t>
+              <a:rPr lang="en-US" dirty="0">
+                <a:solidFill>
+                  <a:srgbClr val="0070C0"/>
+                </a:solidFill>
+              </a:rPr>
+              <a:t>Q&amp;A</a:t>
             </a:r>
           </a:p>
         </p:txBody>
       </p:sp>
-      <p:graphicFrame>
-        <p:nvGraphicFramePr>
-          <p:cNvPr id="8" name="Content Placeholder 4">
-            <a:extLst>
-              <a:ext uri="{FF2B5EF4-FFF2-40B4-BE49-F238E27FC236}">
-                <a16:creationId xmlns:a16="http://schemas.microsoft.com/office/drawing/2014/main" id="{5B6855E3-2188-20C8-4DD6-E45BC792C983}"/>
-              </a:ext>
-            </a:extLst>
-          </p:cNvPr>
-          <p:cNvGraphicFramePr>
-            <a:graphicFrameLocks noGrp="1"/>
-          </p:cNvGraphicFramePr>
-          <p:nvPr>
-            <p:ph type="tbl" sz="quarter" idx="14"/>
-            <p:extLst>
-              <p:ext uri="{D42A27DB-BD31-4B8C-83A1-F6EECF244321}">
-                <p14:modId xmlns:p14="http://schemas.microsoft.com/office/powerpoint/2010/main" val="1736418874"/>
-              </p:ext>
-            </p:extLst>
-          </p:nvPr>
-        </p:nvGraphicFramePr>
-        <p:xfrm>
-          <a:off x="914400" y="2038350"/>
-          <a:ext cx="10515598" cy="3902538"/>
-        </p:xfrm>
-        <a:graphic>
-          <a:graphicData uri="http://schemas.openxmlformats.org/drawingml/2006/table">
-            <a:tbl>
-              <a:tblPr firstRow="1" bandRow="1">
-                <a:tableStyleId>{C4B1156A-380E-4F78-BDF5-A606A8083BF9}</a:tableStyleId>
-              </a:tblPr>
-              <a:tblGrid>
-                <a:gridCol w="3548095">
-                  <a:extLst>
-                    <a:ext uri="{9D8B030D-6E8A-4147-A177-3AD203B41FA5}">
-                      <a16:colId xmlns:a16="http://schemas.microsoft.com/office/drawing/2014/main" val="1689330750"/>
-                    </a:ext>
-                  </a:extLst>
-                </a:gridCol>
-                <a:gridCol w="3548095">
-                  <a:extLst>
-                    <a:ext uri="{9D8B030D-6E8A-4147-A177-3AD203B41FA5}">
-                      <a16:colId xmlns:a16="http://schemas.microsoft.com/office/drawing/2014/main" val="2660631934"/>
-                    </a:ext>
-                  </a:extLst>
-                </a:gridCol>
-                <a:gridCol w="1709704">
-                  <a:extLst>
-                    <a:ext uri="{9D8B030D-6E8A-4147-A177-3AD203B41FA5}">
-                      <a16:colId xmlns:a16="http://schemas.microsoft.com/office/drawing/2014/main" val="3909717689"/>
-                    </a:ext>
-                  </a:extLst>
-                </a:gridCol>
-                <a:gridCol w="1709704">
-                  <a:extLst>
-                    <a:ext uri="{9D8B030D-6E8A-4147-A177-3AD203B41FA5}">
-                      <a16:colId xmlns:a16="http://schemas.microsoft.com/office/drawing/2014/main" val="1603189107"/>
-                    </a:ext>
-                  </a:extLst>
-                </a:gridCol>
-              </a:tblGrid>
-              <a:tr h="650423">
-                <a:tc>
-                  <a:txBody>
-                    <a:bodyPr/>
-                    <a:lstStyle/>
-                    <a:p>
-                      <a:r>
-                        <a:rPr lang="en-US" sz="2000" b="0" dirty="0">
-                          <a:solidFill>
-                            <a:schemeClr val="tx1"/>
-                          </a:solidFill>
-                        </a:rPr>
-                        <a:t>IMPACT FACTOR</a:t>
-                      </a:r>
-                    </a:p>
-                  </a:txBody>
-                  <a:tcPr anchor="ctr"/>
-                </a:tc>
-                <a:tc>
-                  <a:txBody>
-                    <a:bodyPr/>
-                    <a:lstStyle/>
-                    <a:p>
-                      <a:r>
-                        <a:rPr lang="en-US" sz="2000" b="0" dirty="0">
-                          <a:solidFill>
-                            <a:schemeClr val="tx1"/>
-                          </a:solidFill>
-                        </a:rPr>
-                        <a:t>MEASUREMENT</a:t>
-                      </a:r>
-                    </a:p>
-                  </a:txBody>
-                  <a:tcPr anchor="ctr"/>
-                </a:tc>
-                <a:tc>
-                  <a:txBody>
-                    <a:bodyPr/>
-                    <a:lstStyle/>
-                    <a:p>
-                      <a:r>
-                        <a:rPr lang="en-US" sz="2000" b="0" dirty="0">
-                          <a:solidFill>
-                            <a:schemeClr val="tx1"/>
-                          </a:solidFill>
-                        </a:rPr>
-                        <a:t>TARGET</a:t>
-                      </a:r>
-                    </a:p>
-                  </a:txBody>
-                  <a:tcPr anchor="ctr"/>
-                </a:tc>
-                <a:tc>
-                  <a:txBody>
-                    <a:bodyPr/>
-                    <a:lstStyle/>
-                    <a:p>
-                      <a:r>
-                        <a:rPr lang="en-US" sz="2000" b="0" dirty="0">
-                          <a:solidFill>
-                            <a:schemeClr val="tx1"/>
-                          </a:solidFill>
-                        </a:rPr>
-                        <a:t>ACHIEVED</a:t>
-                      </a:r>
-                    </a:p>
-                  </a:txBody>
-                  <a:tcPr anchor="ctr"/>
-                </a:tc>
-                <a:extLst>
-                  <a:ext uri="{0D108BD9-81ED-4DB2-BD59-A6C34878D82A}">
-                    <a16:rowId xmlns:a16="http://schemas.microsoft.com/office/drawing/2014/main" val="479928716"/>
-                  </a:ext>
-                </a:extLst>
-              </a:tr>
-              <a:tr h="650423">
-                <a:tc>
-                  <a:txBody>
-                    <a:bodyPr/>
-                    <a:lstStyle/>
-                    <a:p>
-                      <a:r>
-                        <a:rPr lang="en-US" sz="2000" b="0" dirty="0">
-                          <a:solidFill>
-                            <a:schemeClr val="tx1"/>
-                          </a:solidFill>
-                        </a:rPr>
-                        <a:t>Audience interaction</a:t>
-                      </a:r>
-                    </a:p>
-                  </a:txBody>
-                  <a:tcPr anchor="ctr"/>
-                </a:tc>
-                <a:tc>
-                  <a:txBody>
-                    <a:bodyPr/>
-                    <a:lstStyle/>
-                    <a:p>
-                      <a:r>
-                        <a:rPr lang="en-US" sz="2000" b="0" dirty="0">
-                          <a:solidFill>
-                            <a:schemeClr val="tx1"/>
-                          </a:solidFill>
-                        </a:rPr>
-                        <a:t>Percentage (%)</a:t>
-                      </a:r>
-                    </a:p>
-                  </a:txBody>
-                  <a:tcPr anchor="ctr"/>
-                </a:tc>
-                <a:tc>
-                  <a:txBody>
-                    <a:bodyPr/>
-                    <a:lstStyle/>
-                    <a:p>
-                      <a:r>
-                        <a:rPr lang="en-US" sz="2000" b="0" dirty="0">
-                          <a:solidFill>
-                            <a:schemeClr val="tx1"/>
-                          </a:solidFill>
-                        </a:rPr>
-                        <a:t>85</a:t>
-                      </a:r>
-                    </a:p>
-                  </a:txBody>
-                  <a:tcPr anchor="ctr"/>
-                </a:tc>
-                <a:tc>
-                  <a:txBody>
-                    <a:bodyPr/>
-                    <a:lstStyle/>
-                    <a:p>
-                      <a:r>
-                        <a:rPr lang="en-US" sz="2000" b="0" dirty="0">
-                          <a:solidFill>
-                            <a:schemeClr val="tx1"/>
-                          </a:solidFill>
-                        </a:rPr>
-                        <a:t>88</a:t>
-                      </a:r>
-                    </a:p>
-                  </a:txBody>
-                  <a:tcPr anchor="ctr"/>
-                </a:tc>
-                <a:extLst>
-                  <a:ext uri="{0D108BD9-81ED-4DB2-BD59-A6C34878D82A}">
-                    <a16:rowId xmlns:a16="http://schemas.microsoft.com/office/drawing/2014/main" val="1760208656"/>
-                  </a:ext>
-                </a:extLst>
-              </a:tr>
-              <a:tr h="650423">
-                <a:tc>
-                  <a:txBody>
-                    <a:bodyPr/>
-                    <a:lstStyle/>
-                    <a:p>
-                      <a:r>
-                        <a:rPr lang="en-US" sz="2000" b="0" dirty="0">
-                          <a:solidFill>
-                            <a:schemeClr val="tx1"/>
-                          </a:solidFill>
-                        </a:rPr>
-                        <a:t>Knowledge retention</a:t>
-                      </a:r>
-                    </a:p>
-                  </a:txBody>
-                  <a:tcPr anchor="ctr"/>
-                </a:tc>
-                <a:tc>
-                  <a:txBody>
-                    <a:bodyPr/>
-                    <a:lstStyle/>
-                    <a:p>
-                      <a:r>
-                        <a:rPr lang="en-US" sz="2000" b="0" dirty="0">
-                          <a:solidFill>
-                            <a:schemeClr val="tx1"/>
-                          </a:solidFill>
-                        </a:rPr>
-                        <a:t>Percentage (%)</a:t>
-                      </a:r>
-                    </a:p>
-                  </a:txBody>
-                  <a:tcPr anchor="ctr"/>
-                </a:tc>
-                <a:tc>
-                  <a:txBody>
-                    <a:bodyPr/>
-                    <a:lstStyle/>
-                    <a:p>
-                      <a:r>
-                        <a:rPr lang="en-US" sz="2000" b="0" dirty="0">
-                          <a:solidFill>
-                            <a:schemeClr val="tx1"/>
-                          </a:solidFill>
-                        </a:rPr>
-                        <a:t>75</a:t>
-                      </a:r>
-                    </a:p>
-                  </a:txBody>
-                  <a:tcPr anchor="ctr"/>
-                </a:tc>
-                <a:tc>
-                  <a:txBody>
-                    <a:bodyPr/>
-                    <a:lstStyle/>
-                    <a:p>
-                      <a:r>
-                        <a:rPr lang="en-US" sz="2000" b="0" dirty="0">
-                          <a:solidFill>
-                            <a:schemeClr val="tx1"/>
-                          </a:solidFill>
-                        </a:rPr>
-                        <a:t>80</a:t>
-                      </a:r>
-                    </a:p>
-                  </a:txBody>
-                  <a:tcPr anchor="ctr"/>
-                </a:tc>
-                <a:extLst>
-                  <a:ext uri="{0D108BD9-81ED-4DB2-BD59-A6C34878D82A}">
-                    <a16:rowId xmlns:a16="http://schemas.microsoft.com/office/drawing/2014/main" val="3634243071"/>
-                  </a:ext>
-                </a:extLst>
-              </a:tr>
-              <a:tr h="650423">
-                <a:tc>
-                  <a:txBody>
-                    <a:bodyPr/>
-                    <a:lstStyle/>
-                    <a:p>
-                      <a:r>
-                        <a:rPr lang="en-US" sz="2000" b="0" dirty="0">
-                          <a:solidFill>
-                            <a:schemeClr val="tx1"/>
-                          </a:solidFill>
-                        </a:rPr>
-                        <a:t>Post-presentation surveys</a:t>
-                      </a:r>
-                    </a:p>
-                  </a:txBody>
-                  <a:tcPr anchor="ctr"/>
-                </a:tc>
-                <a:tc>
-                  <a:txBody>
-                    <a:bodyPr/>
-                    <a:lstStyle/>
-                    <a:p>
-                      <a:r>
-                        <a:rPr lang="en-US" sz="2000" b="0" dirty="0">
-                          <a:solidFill>
-                            <a:schemeClr val="tx1"/>
-                          </a:solidFill>
-                        </a:rPr>
-                        <a:t>Average rating</a:t>
-                      </a:r>
-                    </a:p>
-                  </a:txBody>
-                  <a:tcPr anchor="ctr"/>
-                </a:tc>
-                <a:tc>
-                  <a:txBody>
-                    <a:bodyPr/>
-                    <a:lstStyle/>
-                    <a:p>
-                      <a:r>
-                        <a:rPr lang="en-US" sz="2000" b="0" dirty="0">
-                          <a:solidFill>
-                            <a:schemeClr val="tx1"/>
-                          </a:solidFill>
-                        </a:rPr>
-                        <a:t>4.2</a:t>
-                      </a:r>
-                    </a:p>
-                  </a:txBody>
-                  <a:tcPr anchor="ctr"/>
-                </a:tc>
-                <a:tc>
-                  <a:txBody>
-                    <a:bodyPr/>
-                    <a:lstStyle/>
-                    <a:p>
-                      <a:r>
-                        <a:rPr lang="en-US" sz="2000" b="0" dirty="0">
-                          <a:solidFill>
-                            <a:schemeClr val="tx1"/>
-                          </a:solidFill>
-                        </a:rPr>
-                        <a:t>4.5</a:t>
-                      </a:r>
-                    </a:p>
-                  </a:txBody>
-                  <a:tcPr anchor="ctr"/>
-                </a:tc>
-                <a:extLst>
-                  <a:ext uri="{0D108BD9-81ED-4DB2-BD59-A6C34878D82A}">
-                    <a16:rowId xmlns:a16="http://schemas.microsoft.com/office/drawing/2014/main" val="415808797"/>
-                  </a:ext>
-                </a:extLst>
-              </a:tr>
-              <a:tr h="650423">
-                <a:tc>
-                  <a:txBody>
-                    <a:bodyPr/>
-                    <a:lstStyle/>
-                    <a:p>
-                      <a:r>
-                        <a:rPr lang="en-US" sz="2000" b="0" dirty="0">
-                          <a:solidFill>
-                            <a:schemeClr val="tx1"/>
-                          </a:solidFill>
-                        </a:rPr>
-                        <a:t>Referral rate</a:t>
-                      </a:r>
-                    </a:p>
-                  </a:txBody>
-                  <a:tcPr anchor="ctr"/>
-                </a:tc>
-                <a:tc>
-                  <a:txBody>
-                    <a:bodyPr/>
-                    <a:lstStyle/>
-                    <a:p>
-                      <a:r>
-                        <a:rPr lang="en-US" sz="2000" b="0" dirty="0">
-                          <a:solidFill>
-                            <a:schemeClr val="tx1"/>
-                          </a:solidFill>
-                        </a:rPr>
-                        <a:t>Percentage (%)</a:t>
-                      </a:r>
-                    </a:p>
-                  </a:txBody>
-                  <a:tcPr anchor="ctr"/>
-                </a:tc>
-                <a:tc>
-                  <a:txBody>
-                    <a:bodyPr/>
-                    <a:lstStyle/>
-                    <a:p>
-                      <a:r>
-                        <a:rPr lang="en-US" sz="2000" b="0" dirty="0">
-                          <a:solidFill>
-                            <a:schemeClr val="tx1"/>
-                          </a:solidFill>
-                        </a:rPr>
-                        <a:t>10</a:t>
-                      </a:r>
-                    </a:p>
-                  </a:txBody>
-                  <a:tcPr anchor="ctr"/>
-                </a:tc>
-                <a:tc>
-                  <a:txBody>
-                    <a:bodyPr/>
-                    <a:lstStyle/>
-                    <a:p>
-                      <a:r>
-                        <a:rPr lang="en-US" sz="2000" b="0" dirty="0">
-                          <a:solidFill>
-                            <a:schemeClr val="tx1"/>
-                          </a:solidFill>
-                        </a:rPr>
-                        <a:t>12</a:t>
-                      </a:r>
-                    </a:p>
-                  </a:txBody>
-                  <a:tcPr anchor="ctr"/>
-                </a:tc>
-                <a:extLst>
-                  <a:ext uri="{0D108BD9-81ED-4DB2-BD59-A6C34878D82A}">
-                    <a16:rowId xmlns:a16="http://schemas.microsoft.com/office/drawing/2014/main" val="3150194648"/>
-                  </a:ext>
-                </a:extLst>
-              </a:tr>
-              <a:tr h="650423">
-                <a:tc>
-                  <a:txBody>
-                    <a:bodyPr/>
-                    <a:lstStyle/>
-                    <a:p>
-                      <a:r>
-                        <a:rPr lang="en-US" sz="2000" b="0" dirty="0">
-                          <a:solidFill>
-                            <a:schemeClr val="tx1"/>
-                          </a:solidFill>
-                        </a:rPr>
-                        <a:t>Collaboration opportunities</a:t>
-                      </a:r>
-                    </a:p>
-                  </a:txBody>
-                  <a:tcPr anchor="ctr"/>
-                </a:tc>
-                <a:tc>
-                  <a:txBody>
-                    <a:bodyPr/>
-                    <a:lstStyle/>
-                    <a:p>
-                      <a:r>
-                        <a:rPr lang="en-US" sz="2000" b="0" dirty="0">
-                          <a:solidFill>
-                            <a:schemeClr val="tx1"/>
-                          </a:solidFill>
-                        </a:rPr>
-                        <a:t># of opportunities</a:t>
-                      </a:r>
-                    </a:p>
-                  </a:txBody>
-                  <a:tcPr anchor="ctr"/>
-                </a:tc>
-                <a:tc>
-                  <a:txBody>
-                    <a:bodyPr/>
-                    <a:lstStyle/>
-                    <a:p>
-                      <a:r>
-                        <a:rPr lang="en-US" sz="2000" b="0" dirty="0">
-                          <a:solidFill>
-                            <a:schemeClr val="tx1"/>
-                          </a:solidFill>
-                        </a:rPr>
-                        <a:t>8</a:t>
-                      </a:r>
-                    </a:p>
-                  </a:txBody>
-                  <a:tcPr anchor="ctr"/>
-                </a:tc>
-                <a:tc>
-                  <a:txBody>
-                    <a:bodyPr/>
-                    <a:lstStyle/>
-                    <a:p>
-                      <a:r>
-                        <a:rPr lang="en-US" sz="2000" b="0" dirty="0">
-                          <a:solidFill>
-                            <a:schemeClr val="tx1"/>
-                          </a:solidFill>
-                        </a:rPr>
-                        <a:t>10</a:t>
-                      </a:r>
-                    </a:p>
-                  </a:txBody>
-                  <a:tcPr anchor="ctr"/>
-                </a:tc>
-                <a:extLst>
-                  <a:ext uri="{0D108BD9-81ED-4DB2-BD59-A6C34878D82A}">
-                    <a16:rowId xmlns:a16="http://schemas.microsoft.com/office/drawing/2014/main" val="380950325"/>
-                  </a:ext>
-                </a:extLst>
-              </a:tr>
-            </a:tbl>
-          </a:graphicData>
-        </a:graphic>
-      </p:graphicFrame>
       <p:sp>
         <p:nvSpPr>
           <p:cNvPr id="4" name="Slide Number Placeholder 3">
@@ -29081,7 +28392,7 @@
         </p:nvSpPr>
         <p:spPr>
           <a:xfrm>
-            <a:off x="11353800" y="5879804"/>
+            <a:off x="11353800" y="5911071"/>
             <a:ext cx="661416" cy="895899"/>
           </a:xfrm>
         </p:spPr>
@@ -29158,9 +28469,14 @@
           <a:lstStyle/>
           <a:p>
             <a:r>
-              <a:rPr lang="en-US" dirty="0"/>
-              <a:t>thank you</a:t>
+              <a:rPr lang="en-US" sz="4800" dirty="0">
+                <a:solidFill>
+                  <a:srgbClr val="0070C0"/>
+                </a:solidFill>
+              </a:rPr>
+              <a:t>Next week plan</a:t>
             </a:r>
+            <a:endParaRPr lang="en-US" dirty="0"/>
           </a:p>
         </p:txBody>
       </p:sp>
@@ -29190,29 +28506,75 @@
           <a:bodyPr anchor="ctr"/>
           <a:lstStyle/>
           <a:p>
+            <a:pPr marL="342900" marR="0" lvl="0" indent="-342900" algn="l" defTabSz="914400" rtl="0" eaLnBrk="1" fontAlgn="auto" latinLnBrk="0" hangingPunct="1">
+              <a:lnSpc>
+                <a:spcPct val="90000"/>
+              </a:lnSpc>
+              <a:spcBef>
+                <a:spcPts val="1000"/>
+              </a:spcBef>
+              <a:spcAft>
+                <a:spcPts val="0"/>
+              </a:spcAft>
+              <a:buClrTx/>
+              <a:buSzTx/>
+              <a:buFontTx/>
+              <a:buChar char="-"/>
+              <a:tabLst/>
+              <a:defRPr/>
+            </a:pPr>
             <a:r>
-              <a:rPr lang="en-US" dirty="0"/>
-              <a:t>BRITA TAMM</a:t>
+              <a:rPr kumimoji="0" lang="en-US" sz="3600" b="0" i="0" u="none" strike="noStrike" kern="1200" cap="none" spc="0" normalizeH="0" baseline="0" noProof="0" dirty="0">
+                <a:ln>
+                  <a:noFill/>
+                </a:ln>
+                <a:solidFill>
+                  <a:srgbClr val="543E34"/>
+                </a:solidFill>
+                <a:effectLst/>
+                <a:uLnTx/>
+                <a:uFillTx/>
+                <a:latin typeface="Perpetua" panose="02020502060401020303" pitchFamily="18" charset="0"/>
+                <a:ea typeface="+mn-ea"/>
+                <a:cs typeface="+mn-cs"/>
+              </a:rPr>
+              <a:t>Finish on Bayesian Modelling for the other features.</a:t>
             </a:r>
           </a:p>
           <a:p>
+            <a:pPr marL="342900" marR="0" lvl="0" indent="-342900" algn="l" defTabSz="914400" rtl="0" eaLnBrk="1" fontAlgn="auto" latinLnBrk="0" hangingPunct="1">
+              <a:lnSpc>
+                <a:spcPct val="90000"/>
+              </a:lnSpc>
+              <a:spcBef>
+                <a:spcPts val="1000"/>
+              </a:spcBef>
+              <a:spcAft>
+                <a:spcPts val="0"/>
+              </a:spcAft>
+              <a:buClrTx/>
+              <a:buSzTx/>
+              <a:buFontTx/>
+              <a:buChar char="-"/>
+              <a:tabLst/>
+              <a:defRPr/>
+            </a:pPr>
             <a:r>
-              <a:rPr lang="en-US" dirty="0"/>
-              <a:t>502-555-0152</a:t>
-            </a:r>
-          </a:p>
-          <a:p>
-            <a:pPr lvl="1"/>
-            <a:r>
-              <a:rPr lang="en-US" dirty="0"/>
-              <a:t>brita@firstupconsultants.com</a:t>
-            </a:r>
-          </a:p>
-          <a:p>
-            <a:pPr lvl="1"/>
-            <a:r>
-              <a:rPr lang="en-US" dirty="0"/>
-              <a:t>www.firstupconsultants.com</a:t>
+              <a:rPr kumimoji="0" lang="en-US" sz="3600" b="0" i="0" u="none" strike="noStrike" kern="1200" cap="none" spc="0" normalizeH="0" baseline="0" noProof="0" dirty="0">
+                <a:ln>
+                  <a:noFill/>
+                </a:ln>
+                <a:solidFill>
+                  <a:srgbClr val="543E34"/>
+                </a:solidFill>
+                <a:effectLst/>
+                <a:uLnTx/>
+                <a:uFillTx/>
+                <a:latin typeface="Perpetua" panose="02020502060401020303" pitchFamily="18" charset="0"/>
+                <a:ea typeface="+mn-ea"/>
+                <a:cs typeface="+mn-cs"/>
+              </a:rPr>
+              <a:t>Start on design chapter writeup</a:t>
             </a:r>
           </a:p>
           <a:p>
@@ -29779,7 +29141,7 @@
             </a:pPr>
             <a:r>
               <a:rPr lang="en-US" sz="3200" dirty="0"/>
-              <a:t>WEEK 1</a:t>
+              <a:t>WEEK 1 &amp; 2</a:t>
             </a:r>
             <a:br>
               <a:rPr lang="en-US" sz="3200" dirty="0"/>
@@ -30402,16 +29764,69 @@
             <p:ph type="title"/>
           </p:nvPr>
         </p:nvSpPr>
-        <p:spPr/>
+        <p:spPr>
+          <a:xfrm>
+            <a:off x="914400" y="941833"/>
+            <a:ext cx="10360152" cy="914400"/>
+          </a:xfrm>
+        </p:spPr>
         <p:txBody>
           <a:bodyPr/>
           <a:lstStyle/>
           <a:p>
             <a:r>
-              <a:rPr lang="en-US" sz="3200" dirty="0"/>
-              <a:t>Week 2</a:t>
+              <a:rPr lang="en-US" sz="3600" dirty="0">
+                <a:solidFill>
+                  <a:srgbClr val="0070C0"/>
+                </a:solidFill>
+              </a:rPr>
+              <a:t>Week 3 &amp; 4 - </a:t>
             </a:r>
-            <a:endParaRPr lang="en-US" dirty="0"/>
+            <a:r>
+              <a:rPr kumimoji="0" lang="en-US" sz="3600" b="0" i="0" u="none" strike="noStrike" kern="1200" cap="none" spc="0" normalizeH="0" baseline="0" noProof="0" dirty="0">
+                <a:ln>
+                  <a:noFill/>
+                </a:ln>
+                <a:solidFill>
+                  <a:srgbClr val="0070C0"/>
+                </a:solidFill>
+                <a:effectLst/>
+                <a:uLnTx/>
+                <a:uFillTx/>
+                <a:latin typeface="Sagona Book"/>
+                <a:ea typeface="+mj-ea"/>
+                <a:cs typeface="+mj-cs"/>
+              </a:rPr>
+              <a:t>What has been done:</a:t>
+            </a:r>
+            <a:br>
+              <a:rPr kumimoji="0" lang="en-US" sz="3600" b="0" i="0" u="none" strike="noStrike" kern="1200" cap="none" spc="0" normalizeH="0" baseline="0" noProof="0" dirty="0">
+                <a:ln>
+                  <a:noFill/>
+                </a:ln>
+                <a:solidFill>
+                  <a:srgbClr val="0070C0"/>
+                </a:solidFill>
+                <a:effectLst/>
+                <a:uLnTx/>
+                <a:uFillTx/>
+                <a:latin typeface="Sagona Book"/>
+                <a:ea typeface="+mj-ea"/>
+                <a:cs typeface="+mj-cs"/>
+              </a:rPr>
+            </a:br>
+            <a:br>
+              <a:rPr lang="en-US" sz="3600" dirty="0">
+                <a:solidFill>
+                  <a:srgbClr val="0070C0"/>
+                </a:solidFill>
+              </a:rPr>
+            </a:br>
+            <a:endParaRPr lang="en-US" sz="3600" dirty="0">
+              <a:solidFill>
+                <a:srgbClr val="0070C0"/>
+              </a:solidFill>
+            </a:endParaRPr>
           </a:p>
         </p:txBody>
       </p:sp>
@@ -30433,38 +29848,8 @@
         </p:nvSpPr>
         <p:spPr>
           <a:xfrm>
-            <a:off x="914400" y="2039112"/>
-            <a:ext cx="4576953" cy="3877055"/>
-          </a:xfrm>
-        </p:spPr>
-        <p:txBody>
-          <a:bodyPr/>
-          <a:lstStyle/>
-          <a:p>
-            <a:endParaRPr lang="en-US" dirty="0"/>
-          </a:p>
-        </p:txBody>
-      </p:sp>
-      <p:sp>
-        <p:nvSpPr>
-          <p:cNvPr id="17" name="Content Placeholder 16">
-            <a:extLst>
-              <a:ext uri="{FF2B5EF4-FFF2-40B4-BE49-F238E27FC236}">
-                <a16:creationId xmlns:a16="http://schemas.microsoft.com/office/drawing/2014/main" id="{2F3CEF66-C6D7-C765-24E7-1DCFB38FE51A}"/>
-              </a:ext>
-            </a:extLst>
-          </p:cNvPr>
-          <p:cNvSpPr>
-            <a:spLocks noGrp="1"/>
-          </p:cNvSpPr>
-          <p:nvPr>
-            <p:ph sz="quarter" idx="12"/>
-          </p:nvPr>
-        </p:nvSpPr>
-        <p:spPr>
-          <a:xfrm>
-            <a:off x="6357747" y="2039112"/>
-            <a:ext cx="4576953" cy="3877055"/>
+            <a:off x="914400" y="1549668"/>
+            <a:ext cx="9711891" cy="4366500"/>
           </a:xfrm>
         </p:spPr>
         <p:txBody>
@@ -30473,7 +29858,99 @@
           </a:bodyPr>
           <a:lstStyle/>
           <a:p>
-            <a:endParaRPr lang="en-US" dirty="0"/>
+            <a:r>
+              <a:rPr lang="en-US" sz="3100" dirty="0">
+                <a:solidFill>
+                  <a:srgbClr val="543E34"/>
+                </a:solidFill>
+                <a:latin typeface="Perpetua" panose="02020502060401020303" pitchFamily="18" charset="0"/>
+                <a:ea typeface="+mj-ea"/>
+                <a:cs typeface="+mj-cs"/>
+              </a:rPr>
+              <a:t>-   </a:t>
+            </a:r>
+            <a:r>
+              <a:rPr lang="en-US" sz="3600" dirty="0">
+                <a:solidFill>
+                  <a:srgbClr val="543E34"/>
+                </a:solidFill>
+                <a:latin typeface="Perpetua" panose="02020502060401020303" pitchFamily="18" charset="0"/>
+                <a:ea typeface="+mj-ea"/>
+                <a:cs typeface="+mj-cs"/>
+              </a:rPr>
+              <a:t>Introduction, Background of methods, related work research</a:t>
+            </a:r>
+          </a:p>
+          <a:p>
+            <a:pPr marL="342900" indent="-342900">
+              <a:buFontTx/>
+              <a:buChar char="-"/>
+            </a:pPr>
+            <a:r>
+              <a:rPr lang="en-US" sz="3600" dirty="0">
+                <a:solidFill>
+                  <a:srgbClr val="543E34"/>
+                </a:solidFill>
+                <a:latin typeface="Perpetua" panose="02020502060401020303" pitchFamily="18" charset="0"/>
+                <a:ea typeface="+mj-ea"/>
+                <a:cs typeface="+mj-cs"/>
+              </a:rPr>
+              <a:t>Cleaned and encoded features</a:t>
+            </a:r>
+          </a:p>
+          <a:p>
+            <a:pPr marL="342900" indent="-342900">
+              <a:buFontTx/>
+              <a:buChar char="-"/>
+            </a:pPr>
+            <a:r>
+              <a:rPr lang="en-US" sz="3600" dirty="0">
+                <a:solidFill>
+                  <a:srgbClr val="543E34"/>
+                </a:solidFill>
+                <a:latin typeface="Perpetua" panose="02020502060401020303" pitchFamily="18" charset="0"/>
+                <a:ea typeface="+mj-ea"/>
+                <a:cs typeface="+mj-cs"/>
+              </a:rPr>
+              <a:t>Composite score modelling</a:t>
+            </a:r>
+          </a:p>
+          <a:p>
+            <a:pPr marL="342900" indent="-342900">
+              <a:buFontTx/>
+              <a:buChar char="-"/>
+            </a:pPr>
+            <a:r>
+              <a:rPr lang="en-US" sz="3600" dirty="0">
+                <a:solidFill>
+                  <a:srgbClr val="543E34"/>
+                </a:solidFill>
+                <a:latin typeface="Perpetua" panose="02020502060401020303" pitchFamily="18" charset="0"/>
+                <a:ea typeface="+mj-ea"/>
+                <a:cs typeface="+mj-cs"/>
+              </a:rPr>
+              <a:t>Predictive modelling + feature importance – CS model, associations</a:t>
+            </a:r>
+          </a:p>
+          <a:p>
+            <a:pPr marL="342900" indent="-342900">
+              <a:buFontTx/>
+              <a:buChar char="-"/>
+            </a:pPr>
+            <a:r>
+              <a:rPr lang="en-US" sz="3600" dirty="0">
+                <a:solidFill>
+                  <a:srgbClr val="543E34"/>
+                </a:solidFill>
+                <a:latin typeface="Perpetua" panose="02020502060401020303" pitchFamily="18" charset="0"/>
+                <a:ea typeface="+mj-ea"/>
+                <a:cs typeface="+mj-cs"/>
+              </a:rPr>
+              <a:t>Research &amp; reading on Bayesian and causal inference</a:t>
+            </a:r>
+            <a:endParaRPr lang="en-US" sz="3600" dirty="0">
+              <a:latin typeface="Perpetua" panose="02020502060401020303" pitchFamily="18" charset="0"/>
+            </a:endParaRPr>
           </a:p>
         </p:txBody>
       </p:sp>
@@ -30558,39 +30035,10 @@
             <p:ph type="title"/>
           </p:nvPr>
         </p:nvSpPr>
-        <p:spPr/>
-        <p:txBody>
-          <a:bodyPr/>
-          <a:lstStyle/>
-          <a:p>
-            <a:r>
-              <a:rPr lang="en-US" sz="3200" dirty="0"/>
-              <a:t>navigating q&amp;a sessions</a:t>
-            </a:r>
-            <a:endParaRPr lang="en-US" dirty="0"/>
-          </a:p>
-        </p:txBody>
-      </p:sp>
-      <p:sp>
-        <p:nvSpPr>
-          <p:cNvPr id="12" name="Content Placeholder 11">
-            <a:extLst>
-              <a:ext uri="{FF2B5EF4-FFF2-40B4-BE49-F238E27FC236}">
-                <a16:creationId xmlns:a16="http://schemas.microsoft.com/office/drawing/2014/main" id="{C6F2BA06-39BD-0413-D150-70F75EA6CC38}"/>
-              </a:ext>
-            </a:extLst>
-          </p:cNvPr>
-          <p:cNvSpPr>
-            <a:spLocks noGrp="1"/>
-          </p:cNvSpPr>
-          <p:nvPr>
-            <p:ph sz="quarter" idx="13"/>
-          </p:nvPr>
-        </p:nvSpPr>
         <p:spPr>
           <a:xfrm>
-            <a:off x="914399" y="2039112"/>
-            <a:ext cx="3364992" cy="3904488"/>
+            <a:off x="1337190" y="1029903"/>
+            <a:ext cx="10360152" cy="914400"/>
           </a:xfrm>
         </p:spPr>
         <p:txBody>
@@ -30598,21 +30046,18 @@
           <a:lstStyle/>
           <a:p>
             <a:r>
-              <a:rPr lang="en-US" dirty="0"/>
-              <a:t>Know your material in advance</a:t>
+              <a:rPr lang="en-US" sz="3200" dirty="0">
+                <a:solidFill>
+                  <a:srgbClr val="0070C0"/>
+                </a:solidFill>
+              </a:rPr>
+              <a:t>Q&amp;A</a:t>
             </a:r>
-          </a:p>
-          <a:p>
-            <a:r>
-              <a:rPr lang="en-US" dirty="0"/>
-              <a:t>Anticipate common questions</a:t>
-            </a:r>
-          </a:p>
-          <a:p>
-            <a:r>
-              <a:rPr lang="en-US" dirty="0"/>
-              <a:t>Rehearse your responses</a:t>
-            </a:r>
+            <a:endParaRPr lang="en-US" dirty="0">
+              <a:solidFill>
+                <a:srgbClr val="0070C0"/>
+              </a:solidFill>
+            </a:endParaRPr>
           </a:p>
         </p:txBody>
       </p:sp>
@@ -30634,46 +30079,44 @@
         </p:nvSpPr>
         <p:spPr>
           <a:xfrm>
-            <a:off x="4743451" y="2039112"/>
-            <a:ext cx="6537960" cy="3904488"/>
+            <a:off x="1461236" y="2135365"/>
+            <a:ext cx="9145804" cy="3904488"/>
           </a:xfrm>
         </p:spPr>
         <p:txBody>
           <a:bodyPr/>
           <a:lstStyle/>
           <a:p>
+            <a:pPr marL="342900" indent="-342900">
+              <a:buFontTx/>
+              <a:buChar char="-"/>
+            </a:pPr>
             <a:r>
-              <a:rPr lang="en-US" dirty="0"/>
-              <a:t>Maintaining composure during the Q&amp;A session is essential for projecting confidence and authority. Consider the following tips for staying composed:</a:t>
+              <a:rPr lang="en-GB" dirty="0">
+                <a:solidFill>
+                  <a:srgbClr val="222222"/>
+                </a:solidFill>
+                <a:latin typeface="Libre Baskerville"/>
+              </a:rPr>
+              <a:t>Unobserved data – priors?</a:t>
             </a:r>
           </a:p>
           <a:p>
-            <a:pPr lvl="1"/>
+            <a:pPr marL="342900" indent="-342900">
+              <a:buFontTx/>
+              <a:buChar char="-"/>
+            </a:pPr>
             <a:r>
-              <a:rPr lang="en-US" dirty="0"/>
-              <a:t>Stay calm</a:t>
+              <a:rPr lang="en-GB" b="0" i="0" dirty="0">
+                <a:solidFill>
+                  <a:srgbClr val="222222"/>
+                </a:solidFill>
+                <a:effectLst/>
+                <a:latin typeface="Libre Baskerville"/>
+              </a:rPr>
+              <a:t>How to assign prior distributions to such variables</a:t>
             </a:r>
-          </a:p>
-          <a:p>
-            <a:pPr lvl="1"/>
-            <a:r>
-              <a:rPr lang="en-US" dirty="0"/>
-              <a:t>Actively listen</a:t>
-            </a:r>
-          </a:p>
-          <a:p>
-            <a:pPr lvl="1"/>
-            <a:r>
-              <a:rPr lang="en-US" dirty="0"/>
-              <a:t>Pause and reflect</a:t>
-            </a:r>
-          </a:p>
-          <a:p>
-            <a:pPr lvl="1"/>
-            <a:r>
-              <a:rPr lang="en-US" dirty="0"/>
-              <a:t>Maintain eye contact</a:t>
-            </a:r>
+            <a:endParaRPr lang="en-US" dirty="0"/>
           </a:p>
         </p:txBody>
       </p:sp>
@@ -30764,10 +30207,13 @@
           <a:lstStyle/>
           <a:p>
             <a:r>
-              <a:rPr lang="en-US" sz="3200" dirty="0"/>
-              <a:t>speaking impact</a:t>
+              <a:rPr lang="en-US" sz="3600" dirty="0">
+                <a:solidFill>
+                  <a:srgbClr val="0070C0"/>
+                </a:solidFill>
+              </a:rPr>
+              <a:t>Next week plan</a:t>
             </a:r>
-            <a:endParaRPr lang="en-US" dirty="0"/>
           </a:p>
         </p:txBody>
       </p:sp>
@@ -30789,24 +30235,49 @@
         </p:nvSpPr>
         <p:spPr>
           <a:xfrm>
-            <a:off x="914399" y="2039111"/>
-            <a:ext cx="5650992" cy="3904488"/>
+            <a:off x="914398" y="2039111"/>
+            <a:ext cx="6689559" cy="3904488"/>
           </a:xfrm>
         </p:spPr>
         <p:txBody>
           <a:bodyPr/>
           <a:lstStyle/>
           <a:p>
+            <a:pPr marL="342900" indent="-342900">
+              <a:buFontTx/>
+              <a:buChar char="-"/>
+            </a:pPr>
             <a:r>
-              <a:rPr lang="en-US" dirty="0"/>
-              <a:t>Your ability to communicate effectively will leave a lasting impact on your audience</a:t>
+              <a:rPr lang="en-US" sz="3600" dirty="0">
+                <a:solidFill>
+                  <a:srgbClr val="543E34"/>
+                </a:solidFill>
+                <a:latin typeface="Perpetua" panose="02020502060401020303" pitchFamily="18" charset="0"/>
+                <a:ea typeface="+mj-ea"/>
+                <a:cs typeface="+mj-cs"/>
+              </a:rPr>
+              <a:t>Causal Inference Modelling - code</a:t>
             </a:r>
           </a:p>
           <a:p>
+            <a:pPr marL="342900" indent="-342900">
+              <a:buFontTx/>
+              <a:buChar char="-"/>
+            </a:pPr>
             <a:r>
-              <a:rPr lang="en-US" dirty="0"/>
-              <a:t>Effectively communicating involves not only delivering a message but also resonating with the experiences, values, and emotions of those listening </a:t>
+              <a:rPr lang="en-US" sz="3600" dirty="0">
+                <a:solidFill>
+                  <a:srgbClr val="543E34"/>
+                </a:solidFill>
+                <a:latin typeface="Perpetua" panose="02020502060401020303" pitchFamily="18" charset="0"/>
+                <a:ea typeface="+mj-ea"/>
+                <a:cs typeface="+mj-cs"/>
+              </a:rPr>
+              <a:t>Start on design chapter writeup</a:t>
             </a:r>
+          </a:p>
+          <a:p>
+            <a:endParaRPr lang="en-US" dirty="0"/>
           </a:p>
         </p:txBody>
       </p:sp>
@@ -30833,8 +30304,8 @@
         </p:blipFill>
         <p:spPr>
           <a:xfrm>
-            <a:off x="7623125" y="-20757"/>
-            <a:ext cx="4589511" cy="6555026"/>
+            <a:off x="7873465" y="-20757"/>
+            <a:ext cx="4339171" cy="5420530"/>
           </a:xfrm>
         </p:spPr>
       </p:pic>

</xml_diff>